<commit_message>
IBFE Lecture 4 and Examples
</commit_message>
<xml_diff>
--- a/IBFE Lectures/2-IBFE Make your own mesh and move it!.pptx
+++ b/IBFE Lectures/2-IBFE Make your own mesh and move it!.pptx
@@ -256,6 +256,11 @@
       </a:defRPr>
     </a:lvl9pPr>
   </p:defaultTextStyle>
+  <p:extLst>
+    <p:ext uri="{EFAFB233-063F-42B5-8137-9DF3F51BA10A}">
+      <p15:sldGuideLst xmlns:p15="http://schemas.microsoft.com/office/powerpoint/2012/main"/>
+    </p:ext>
+  </p:extLst>
 </p:presentation>
 </file>
 
@@ -8326,11 +8331,7 @@
             </a:r>
             <a:r>
               <a:rPr lang="en" dirty="0" smtClean="0"/>
-              <a:t>My</a:t>
-            </a:r>
-            <a:r>
-              <a:rPr lang="en" dirty="0" smtClean="0"/>
-              <a:t>IBFE_Example -TetherForceFullTriangle2D.</a:t>
+              <a:t>MyIBFE_Example -TetherForceFullTriangle2D.</a:t>
             </a:r>
             <a:endParaRPr dirty="0"/>
           </a:p>
@@ -8347,7 +8348,11 @@
             </a:pPr>
             <a:r>
               <a:rPr lang="en" dirty="0"/>
-              <a:t>Download gmsh.</a:t>
+              <a:t>Download </a:t>
+            </a:r>
+            <a:r>
+              <a:rPr lang="en" dirty="0" smtClean="0"/>
+              <a:t>gmsh – version 2.9.0.</a:t>
             </a:r>
             <a:endParaRPr dirty="0"/>
           </a:p>
@@ -8998,10 +9003,10 @@
               <a:buNone/>
             </a:pPr>
             <a:r>
-              <a:rPr lang="en"/>
+              <a:rPr lang="en" dirty="0"/>
               <a:t>From here we will make the mesh, but we need to consider a couple things first.</a:t>
             </a:r>
-            <a:endParaRPr/>
+            <a:endParaRPr dirty="0"/>
           </a:p>
           <a:p>
             <a:pPr marL="0" lvl="0" indent="0" algn="l" rtl="0">
@@ -9014,10 +9019,18 @@
               <a:buNone/>
             </a:pPr>
             <a:r>
-              <a:rPr lang="en"/>
-              <a:t>In this example, the finest mesh is effectively 128x128 (coarsest grid is 32x42, there are 2 levels and a 4:1 refinement ratio).</a:t>
+              <a:rPr lang="en" dirty="0"/>
+              <a:t>In this example, the finest mesh is effectively 128x128 (coarsest grid is </a:t>
             </a:r>
-            <a:endParaRPr/>
+            <a:r>
+              <a:rPr lang="en" dirty="0" smtClean="0"/>
+              <a:t>32x32</a:t>
+            </a:r>
+            <a:r>
+              <a:rPr lang="en" dirty="0"/>
+              <a:t>, there are 2 levels and a 4:1 refinement ratio).</a:t>
+            </a:r>
+            <a:endParaRPr dirty="0"/>
           </a:p>
           <a:p>
             <a:pPr marL="0" lvl="0" indent="0" algn="l" rtl="0">
@@ -9030,10 +9043,30 @@
               <a:buNone/>
             </a:pPr>
             <a:r>
+              <a:rPr lang="en" dirty="0"/>
+              <a:t>We want the </a:t>
+            </a:r>
+            <a:r>
+              <a:rPr lang="en" dirty="0" smtClean="0"/>
+              <a:t>ratio </a:t>
+            </a:r>
+            <a:r>
+              <a:rPr lang="en" dirty="0"/>
+              <a:t>of the finite element mesh to the Cartesian mesh to be 1:1. We will therefore pick a meshwidth </a:t>
+            </a:r>
+            <a:r>
               <a:rPr lang="en"/>
-              <a:t>We want the ration of the finite element mesh to the Cartesian mesh to be 1:1. We will therefore pick a meshwidth of 1/64 = 0.0156.</a:t>
+              <a:t>of </a:t>
             </a:r>
-            <a:endParaRPr/>
+            <a:r>
+              <a:rPr lang="en" smtClean="0"/>
+              <a:t>L/NFINEST = 2.0/128 = 1/64 </a:t>
+            </a:r>
+            <a:r>
+              <a:rPr lang="en" dirty="0"/>
+              <a:t>= 0.0156.</a:t>
+            </a:r>
+            <a:endParaRPr dirty="0"/>
           </a:p>
         </p:txBody>
       </p:sp>

</xml_diff>